<commit_message>
Arthur ou es tu?
</commit_message>
<xml_diff>
--- a/crawlers/Results Monop/CalculDistance/results_images/MatDist_ingredients.pptx
+++ b/crawlers/Results Monop/CalculDistance/results_images/MatDist_ingredients.pptx
@@ -3095,1037 +3095,1052 @@
           <a:chExt cx="0" cy="0"/>
         </a:xfrm>
       </p:grpSpPr>
-      <p:pic>
-        <p:nvPicPr>
-          <p:cNvPr id="4" name="Image 3"/>
-          <p:cNvPicPr>
-            <a:picLocks noChangeAspect="1"/>
-          </p:cNvPicPr>
-          <p:nvPr/>
-        </p:nvPicPr>
-        <p:blipFill>
-          <a:blip r:embed="rId2">
-            <a:extLst>
-              <a:ext uri="{28A0092B-C50C-407E-A947-70E740481C1C}">
-                <a14:useLocalDpi xmlns:a14="http://schemas.microsoft.com/office/drawing/2010/main" val="0"/>
-              </a:ext>
-            </a:extLst>
-          </a:blip>
-          <a:stretch>
-            <a:fillRect/>
-          </a:stretch>
-        </p:blipFill>
-        <p:spPr>
-          <a:xfrm>
-            <a:off x="1104430" y="1411110"/>
-            <a:ext cx="7922747" cy="5446889"/>
-          </a:xfrm>
-          <a:prstGeom prst="rect">
-            <a:avLst/>
-          </a:prstGeom>
-        </p:spPr>
-      </p:pic>
       <p:grpSp>
         <p:nvGrpSpPr>
-          <p:cNvPr id="9" name="Grouper 8"/>
+          <p:cNvPr id="2" name="Grouper 1"/>
           <p:cNvGrpSpPr/>
           <p:nvPr/>
         </p:nvGrpSpPr>
         <p:grpSpPr>
           <a:xfrm>
-            <a:off x="1021307" y="2693352"/>
-            <a:ext cx="1656168" cy="691558"/>
-            <a:chOff x="1021307" y="2869852"/>
-            <a:chExt cx="1616324" cy="799249"/>
+            <a:off x="1013849" y="1411110"/>
+            <a:ext cx="8013328" cy="5454619"/>
+            <a:chOff x="1013849" y="1411110"/>
+            <a:chExt cx="8013328" cy="5454619"/>
           </a:xfrm>
         </p:grpSpPr>
-        <p:sp>
-          <p:nvSpPr>
-            <p:cNvPr id="7" name="Accolade ouvrante 6"/>
-            <p:cNvSpPr/>
+        <p:pic>
+          <p:nvPicPr>
+            <p:cNvPr id="4" name="Image 3"/>
+            <p:cNvPicPr>
+              <a:picLocks noChangeAspect="1"/>
+            </p:cNvPicPr>
             <p:nvPr/>
-          </p:nvSpPr>
+          </p:nvPicPr>
+          <p:blipFill>
+            <a:blip r:embed="rId2">
+              <a:extLst>
+                <a:ext uri="{28A0092B-C50C-407E-A947-70E740481C1C}">
+                  <a14:useLocalDpi xmlns:a14="http://schemas.microsoft.com/office/drawing/2010/main" val="0"/>
+                </a:ext>
+              </a:extLst>
+            </a:blip>
+            <a:stretch>
+              <a:fillRect/>
+            </a:stretch>
+          </p:blipFill>
           <p:spPr>
             <a:xfrm>
-              <a:off x="2211345" y="2869852"/>
-              <a:ext cx="115452" cy="799249"/>
-            </a:xfrm>
-            <a:prstGeom prst="leftBrace">
-              <a:avLst/>
-            </a:prstGeom>
-          </p:spPr>
-          <p:style>
-            <a:lnRef idx="2">
-              <a:schemeClr val="accent1"/>
-            </a:lnRef>
-            <a:fillRef idx="0">
-              <a:schemeClr val="accent1"/>
-            </a:fillRef>
-            <a:effectRef idx="1">
-              <a:schemeClr val="accent1"/>
-            </a:effectRef>
-            <a:fontRef idx="minor">
-              <a:schemeClr val="tx1"/>
-            </a:fontRef>
-          </p:style>
-          <p:txBody>
-            <a:bodyPr rtlCol="0" anchor="ctr"/>
-            <a:lstStyle/>
-            <a:p>
-              <a:pPr algn="ctr"/>
-              <a:endParaRPr lang="fr-FR"/>
-            </a:p>
-          </p:txBody>
-        </p:sp>
-        <p:sp>
-          <p:nvSpPr>
-            <p:cNvPr id="8" name="ZoneTexte 7"/>
-            <p:cNvSpPr txBox="1"/>
-            <p:nvPr/>
-          </p:nvSpPr>
-          <p:spPr>
-            <a:xfrm>
-              <a:off x="1021307" y="3139857"/>
-              <a:ext cx="1616324" cy="276999"/>
+              <a:off x="1104430" y="1411110"/>
+              <a:ext cx="7922747" cy="5446889"/>
             </a:xfrm>
             <a:prstGeom prst="rect">
               <a:avLst/>
             </a:prstGeom>
-            <a:noFill/>
           </p:spPr>
-          <p:txBody>
-            <a:bodyPr wrap="square" rtlCol="0">
-              <a:spAutoFit/>
-            </a:bodyPr>
-            <a:lstStyle/>
-            <a:p>
-              <a:r>
-                <a:rPr lang="fr-FR" sz="1200" dirty="0" smtClean="0"/>
-                <a:t>Gold Standard 2</a:t>
-              </a:r>
-              <a:endParaRPr lang="fr-FR" sz="1200" dirty="0"/>
-            </a:p>
-          </p:txBody>
-        </p:sp>
-      </p:grpSp>
-      <p:grpSp>
-        <p:nvGrpSpPr>
-          <p:cNvPr id="10" name="Grouper 9"/>
-          <p:cNvGrpSpPr/>
-          <p:nvPr/>
-        </p:nvGrpSpPr>
-        <p:grpSpPr>
-          <a:xfrm>
-            <a:off x="1021307" y="3412665"/>
-            <a:ext cx="1656168" cy="691558"/>
-            <a:chOff x="1021307" y="2869852"/>
-            <a:chExt cx="1616324" cy="799249"/>
-          </a:xfrm>
-        </p:grpSpPr>
-        <p:sp>
-          <p:nvSpPr>
-            <p:cNvPr id="11" name="Accolade ouvrante 10"/>
-            <p:cNvSpPr/>
+        </p:pic>
+        <p:grpSp>
+          <p:nvGrpSpPr>
+            <p:cNvPr id="9" name="Grouper 8"/>
+            <p:cNvGrpSpPr/>
             <p:nvPr/>
-          </p:nvSpPr>
-          <p:spPr>
+          </p:nvGrpSpPr>
+          <p:grpSpPr>
             <a:xfrm>
-              <a:off x="2211345" y="2869852"/>
-              <a:ext cx="115452" cy="799249"/>
+              <a:off x="1021307" y="2693352"/>
+              <a:ext cx="1656168" cy="691558"/>
+              <a:chOff x="1021307" y="2869852"/>
+              <a:chExt cx="1616324" cy="799249"/>
             </a:xfrm>
-            <a:prstGeom prst="leftBrace">
-              <a:avLst/>
-            </a:prstGeom>
-          </p:spPr>
-          <p:style>
-            <a:lnRef idx="2">
-              <a:schemeClr val="accent1"/>
-            </a:lnRef>
-            <a:fillRef idx="0">
-              <a:schemeClr val="accent1"/>
-            </a:fillRef>
-            <a:effectRef idx="1">
-              <a:schemeClr val="accent1"/>
-            </a:effectRef>
-            <a:fontRef idx="minor">
-              <a:schemeClr val="tx1"/>
-            </a:fontRef>
-          </p:style>
-          <p:txBody>
-            <a:bodyPr rtlCol="0" anchor="ctr"/>
-            <a:lstStyle/>
-            <a:p>
-              <a:pPr algn="ctr"/>
-              <a:endParaRPr lang="fr-FR"/>
-            </a:p>
-          </p:txBody>
-        </p:sp>
-        <p:sp>
-          <p:nvSpPr>
-            <p:cNvPr id="12" name="ZoneTexte 11"/>
-            <p:cNvSpPr txBox="1"/>
+          </p:grpSpPr>
+          <p:sp>
+            <p:nvSpPr>
+              <p:cNvPr id="7" name="Accolade ouvrante 6"/>
+              <p:cNvSpPr/>
+              <p:nvPr/>
+            </p:nvSpPr>
+            <p:spPr>
+              <a:xfrm>
+                <a:off x="2211345" y="2869852"/>
+                <a:ext cx="115452" cy="799249"/>
+              </a:xfrm>
+              <a:prstGeom prst="leftBrace">
+                <a:avLst/>
+              </a:prstGeom>
+            </p:spPr>
+            <p:style>
+              <a:lnRef idx="2">
+                <a:schemeClr val="accent1"/>
+              </a:lnRef>
+              <a:fillRef idx="0">
+                <a:schemeClr val="accent1"/>
+              </a:fillRef>
+              <a:effectRef idx="1">
+                <a:schemeClr val="accent1"/>
+              </a:effectRef>
+              <a:fontRef idx="minor">
+                <a:schemeClr val="tx1"/>
+              </a:fontRef>
+            </p:style>
+            <p:txBody>
+              <a:bodyPr rtlCol="0" anchor="ctr"/>
+              <a:lstStyle/>
+              <a:p>
+                <a:pPr algn="ctr"/>
+                <a:endParaRPr lang="fr-FR"/>
+              </a:p>
+            </p:txBody>
+          </p:sp>
+          <p:sp>
+            <p:nvSpPr>
+              <p:cNvPr id="8" name="ZoneTexte 7"/>
+              <p:cNvSpPr txBox="1"/>
+              <p:nvPr/>
+            </p:nvSpPr>
+            <p:spPr>
+              <a:xfrm>
+                <a:off x="1021307" y="3139857"/>
+                <a:ext cx="1616324" cy="276999"/>
+              </a:xfrm>
+              <a:prstGeom prst="rect">
+                <a:avLst/>
+              </a:prstGeom>
+              <a:noFill/>
+            </p:spPr>
+            <p:txBody>
+              <a:bodyPr wrap="square" rtlCol="0">
+                <a:spAutoFit/>
+              </a:bodyPr>
+              <a:lstStyle/>
+              <a:p>
+                <a:r>
+                  <a:rPr lang="fr-FR" sz="1200" dirty="0" smtClean="0"/>
+                  <a:t>Gold Standard 2</a:t>
+                </a:r>
+                <a:endParaRPr lang="fr-FR" sz="1200" dirty="0"/>
+              </a:p>
+            </p:txBody>
+          </p:sp>
+        </p:grpSp>
+        <p:grpSp>
+          <p:nvGrpSpPr>
+            <p:cNvPr id="10" name="Grouper 9"/>
+            <p:cNvGrpSpPr/>
             <p:nvPr/>
-          </p:nvSpPr>
-          <p:spPr>
+          </p:nvGrpSpPr>
+          <p:grpSpPr>
             <a:xfrm>
-              <a:off x="1021307" y="3139857"/>
-              <a:ext cx="1616324" cy="276999"/>
+              <a:off x="1021307" y="3412665"/>
+              <a:ext cx="1656168" cy="691558"/>
+              <a:chOff x="1021307" y="2869852"/>
+              <a:chExt cx="1616324" cy="799249"/>
             </a:xfrm>
-            <a:prstGeom prst="rect">
-              <a:avLst/>
-            </a:prstGeom>
-            <a:noFill/>
-          </p:spPr>
-          <p:txBody>
-            <a:bodyPr wrap="square" rtlCol="0">
-              <a:spAutoFit/>
-            </a:bodyPr>
-            <a:lstStyle/>
-            <a:p>
-              <a:r>
-                <a:rPr lang="fr-FR" sz="1200" dirty="0" smtClean="0"/>
-                <a:t>Gold Standard 3</a:t>
-              </a:r>
-              <a:endParaRPr lang="fr-FR" sz="1200" dirty="0"/>
-            </a:p>
-          </p:txBody>
-        </p:sp>
-      </p:grpSp>
-      <p:grpSp>
-        <p:nvGrpSpPr>
-          <p:cNvPr id="13" name="Grouper 12"/>
-          <p:cNvGrpSpPr/>
-          <p:nvPr/>
-        </p:nvGrpSpPr>
-        <p:grpSpPr>
-          <a:xfrm>
-            <a:off x="1022730" y="4124568"/>
-            <a:ext cx="1656168" cy="691558"/>
-            <a:chOff x="1021307" y="2869852"/>
-            <a:chExt cx="1616324" cy="799249"/>
-          </a:xfrm>
-        </p:grpSpPr>
-        <p:sp>
-          <p:nvSpPr>
-            <p:cNvPr id="14" name="Accolade ouvrante 13"/>
-            <p:cNvSpPr/>
+          </p:grpSpPr>
+          <p:sp>
+            <p:nvSpPr>
+              <p:cNvPr id="11" name="Accolade ouvrante 10"/>
+              <p:cNvSpPr/>
+              <p:nvPr/>
+            </p:nvSpPr>
+            <p:spPr>
+              <a:xfrm>
+                <a:off x="2211345" y="2869852"/>
+                <a:ext cx="115452" cy="799249"/>
+              </a:xfrm>
+              <a:prstGeom prst="leftBrace">
+                <a:avLst/>
+              </a:prstGeom>
+            </p:spPr>
+            <p:style>
+              <a:lnRef idx="2">
+                <a:schemeClr val="accent1"/>
+              </a:lnRef>
+              <a:fillRef idx="0">
+                <a:schemeClr val="accent1"/>
+              </a:fillRef>
+              <a:effectRef idx="1">
+                <a:schemeClr val="accent1"/>
+              </a:effectRef>
+              <a:fontRef idx="minor">
+                <a:schemeClr val="tx1"/>
+              </a:fontRef>
+            </p:style>
+            <p:txBody>
+              <a:bodyPr rtlCol="0" anchor="ctr"/>
+              <a:lstStyle/>
+              <a:p>
+                <a:pPr algn="ctr"/>
+                <a:endParaRPr lang="fr-FR"/>
+              </a:p>
+            </p:txBody>
+          </p:sp>
+          <p:sp>
+            <p:nvSpPr>
+              <p:cNvPr id="12" name="ZoneTexte 11"/>
+              <p:cNvSpPr txBox="1"/>
+              <p:nvPr/>
+            </p:nvSpPr>
+            <p:spPr>
+              <a:xfrm>
+                <a:off x="1021307" y="3139857"/>
+                <a:ext cx="1616324" cy="276999"/>
+              </a:xfrm>
+              <a:prstGeom prst="rect">
+                <a:avLst/>
+              </a:prstGeom>
+              <a:noFill/>
+            </p:spPr>
+            <p:txBody>
+              <a:bodyPr wrap="square" rtlCol="0">
+                <a:spAutoFit/>
+              </a:bodyPr>
+              <a:lstStyle/>
+              <a:p>
+                <a:r>
+                  <a:rPr lang="fr-FR" sz="1200" dirty="0" smtClean="0"/>
+                  <a:t>Gold Standard 3</a:t>
+                </a:r>
+                <a:endParaRPr lang="fr-FR" sz="1200" dirty="0"/>
+              </a:p>
+            </p:txBody>
+          </p:sp>
+        </p:grpSp>
+        <p:grpSp>
+          <p:nvGrpSpPr>
+            <p:cNvPr id="13" name="Grouper 12"/>
+            <p:cNvGrpSpPr/>
             <p:nvPr/>
-          </p:nvSpPr>
-          <p:spPr>
+          </p:nvGrpSpPr>
+          <p:grpSpPr>
             <a:xfrm>
-              <a:off x="2211345" y="2869852"/>
-              <a:ext cx="115452" cy="799249"/>
+              <a:off x="1022730" y="4124568"/>
+              <a:ext cx="1656168" cy="691558"/>
+              <a:chOff x="1021307" y="2869852"/>
+              <a:chExt cx="1616324" cy="799249"/>
             </a:xfrm>
-            <a:prstGeom prst="leftBrace">
-              <a:avLst/>
-            </a:prstGeom>
-          </p:spPr>
-          <p:style>
-            <a:lnRef idx="2">
-              <a:schemeClr val="accent1"/>
-            </a:lnRef>
-            <a:fillRef idx="0">
-              <a:schemeClr val="accent1"/>
-            </a:fillRef>
-            <a:effectRef idx="1">
-              <a:schemeClr val="accent1"/>
-            </a:effectRef>
-            <a:fontRef idx="minor">
-              <a:schemeClr val="tx1"/>
-            </a:fontRef>
-          </p:style>
-          <p:txBody>
-            <a:bodyPr rtlCol="0" anchor="ctr"/>
-            <a:lstStyle/>
-            <a:p>
-              <a:pPr algn="ctr"/>
-              <a:endParaRPr lang="fr-FR"/>
-            </a:p>
-          </p:txBody>
-        </p:sp>
-        <p:sp>
-          <p:nvSpPr>
-            <p:cNvPr id="15" name="ZoneTexte 14"/>
-            <p:cNvSpPr txBox="1"/>
+          </p:grpSpPr>
+          <p:sp>
+            <p:nvSpPr>
+              <p:cNvPr id="14" name="Accolade ouvrante 13"/>
+              <p:cNvSpPr/>
+              <p:nvPr/>
+            </p:nvSpPr>
+            <p:spPr>
+              <a:xfrm>
+                <a:off x="2211345" y="2869852"/>
+                <a:ext cx="115452" cy="799249"/>
+              </a:xfrm>
+              <a:prstGeom prst="leftBrace">
+                <a:avLst/>
+              </a:prstGeom>
+            </p:spPr>
+            <p:style>
+              <a:lnRef idx="2">
+                <a:schemeClr val="accent1"/>
+              </a:lnRef>
+              <a:fillRef idx="0">
+                <a:schemeClr val="accent1"/>
+              </a:fillRef>
+              <a:effectRef idx="1">
+                <a:schemeClr val="accent1"/>
+              </a:effectRef>
+              <a:fontRef idx="minor">
+                <a:schemeClr val="tx1"/>
+              </a:fontRef>
+            </p:style>
+            <p:txBody>
+              <a:bodyPr rtlCol="0" anchor="ctr"/>
+              <a:lstStyle/>
+              <a:p>
+                <a:pPr algn="ctr"/>
+                <a:endParaRPr lang="fr-FR"/>
+              </a:p>
+            </p:txBody>
+          </p:sp>
+          <p:sp>
+            <p:nvSpPr>
+              <p:cNvPr id="15" name="ZoneTexte 14"/>
+              <p:cNvSpPr txBox="1"/>
+              <p:nvPr/>
+            </p:nvSpPr>
+            <p:spPr>
+              <a:xfrm>
+                <a:off x="1021307" y="3139857"/>
+                <a:ext cx="1616324" cy="276999"/>
+              </a:xfrm>
+              <a:prstGeom prst="rect">
+                <a:avLst/>
+              </a:prstGeom>
+              <a:noFill/>
+            </p:spPr>
+            <p:txBody>
+              <a:bodyPr wrap="square" rtlCol="0">
+                <a:spAutoFit/>
+              </a:bodyPr>
+              <a:lstStyle/>
+              <a:p>
+                <a:r>
+                  <a:rPr lang="fr-FR" sz="1200" dirty="0" smtClean="0"/>
+                  <a:t>Gold Standard 4</a:t>
+                </a:r>
+                <a:endParaRPr lang="fr-FR" sz="1200" dirty="0"/>
+              </a:p>
+            </p:txBody>
+          </p:sp>
+        </p:grpSp>
+        <p:grpSp>
+          <p:nvGrpSpPr>
+            <p:cNvPr id="16" name="Grouper 15"/>
+            <p:cNvGrpSpPr/>
             <p:nvPr/>
-          </p:nvSpPr>
-          <p:spPr>
+          </p:nvGrpSpPr>
+          <p:grpSpPr>
             <a:xfrm>
-              <a:off x="1021307" y="3139857"/>
-              <a:ext cx="1616324" cy="276999"/>
+              <a:off x="1024153" y="4871995"/>
+              <a:ext cx="1656168" cy="691558"/>
+              <a:chOff x="1021307" y="2869852"/>
+              <a:chExt cx="1616324" cy="799249"/>
             </a:xfrm>
-            <a:prstGeom prst="rect">
-              <a:avLst/>
-            </a:prstGeom>
-            <a:noFill/>
-          </p:spPr>
-          <p:txBody>
-            <a:bodyPr wrap="square" rtlCol="0">
-              <a:spAutoFit/>
-            </a:bodyPr>
-            <a:lstStyle/>
-            <a:p>
-              <a:r>
-                <a:rPr lang="fr-FR" sz="1200" dirty="0" smtClean="0"/>
-                <a:t>Gold Standard 4</a:t>
-              </a:r>
-              <a:endParaRPr lang="fr-FR" sz="1200" dirty="0"/>
-            </a:p>
-          </p:txBody>
-        </p:sp>
-      </p:grpSp>
-      <p:grpSp>
-        <p:nvGrpSpPr>
-          <p:cNvPr id="16" name="Grouper 15"/>
-          <p:cNvGrpSpPr/>
-          <p:nvPr/>
-        </p:nvGrpSpPr>
-        <p:grpSpPr>
-          <a:xfrm>
-            <a:off x="1024153" y="4871995"/>
-            <a:ext cx="1656168" cy="691558"/>
-            <a:chOff x="1021307" y="2869852"/>
-            <a:chExt cx="1616324" cy="799249"/>
-          </a:xfrm>
-        </p:grpSpPr>
-        <p:sp>
-          <p:nvSpPr>
-            <p:cNvPr id="17" name="Accolade ouvrante 16"/>
-            <p:cNvSpPr/>
+          </p:grpSpPr>
+          <p:sp>
+            <p:nvSpPr>
+              <p:cNvPr id="17" name="Accolade ouvrante 16"/>
+              <p:cNvSpPr/>
+              <p:nvPr/>
+            </p:nvSpPr>
+            <p:spPr>
+              <a:xfrm>
+                <a:off x="2211345" y="2869852"/>
+                <a:ext cx="115452" cy="799249"/>
+              </a:xfrm>
+              <a:prstGeom prst="leftBrace">
+                <a:avLst/>
+              </a:prstGeom>
+            </p:spPr>
+            <p:style>
+              <a:lnRef idx="2">
+                <a:schemeClr val="accent1"/>
+              </a:lnRef>
+              <a:fillRef idx="0">
+                <a:schemeClr val="accent1"/>
+              </a:fillRef>
+              <a:effectRef idx="1">
+                <a:schemeClr val="accent1"/>
+              </a:effectRef>
+              <a:fontRef idx="minor">
+                <a:schemeClr val="tx1"/>
+              </a:fontRef>
+            </p:style>
+            <p:txBody>
+              <a:bodyPr rtlCol="0" anchor="ctr"/>
+              <a:lstStyle/>
+              <a:p>
+                <a:pPr algn="ctr"/>
+                <a:endParaRPr lang="fr-FR"/>
+              </a:p>
+            </p:txBody>
+          </p:sp>
+          <p:sp>
+            <p:nvSpPr>
+              <p:cNvPr id="18" name="ZoneTexte 17"/>
+              <p:cNvSpPr txBox="1"/>
+              <p:nvPr/>
+            </p:nvSpPr>
+            <p:spPr>
+              <a:xfrm>
+                <a:off x="1021307" y="3139857"/>
+                <a:ext cx="1616324" cy="276999"/>
+              </a:xfrm>
+              <a:prstGeom prst="rect">
+                <a:avLst/>
+              </a:prstGeom>
+              <a:noFill/>
+            </p:spPr>
+            <p:txBody>
+              <a:bodyPr wrap="square" rtlCol="0">
+                <a:spAutoFit/>
+              </a:bodyPr>
+              <a:lstStyle/>
+              <a:p>
+                <a:r>
+                  <a:rPr lang="fr-FR" sz="1200" dirty="0" smtClean="0"/>
+                  <a:t>Gold Standard 5</a:t>
+                </a:r>
+                <a:endParaRPr lang="fr-FR" sz="1200" dirty="0"/>
+              </a:p>
+            </p:txBody>
+          </p:sp>
+        </p:grpSp>
+        <p:grpSp>
+          <p:nvGrpSpPr>
+            <p:cNvPr id="20" name="Grouper 19"/>
+            <p:cNvGrpSpPr/>
             <p:nvPr/>
-          </p:nvSpPr>
-          <p:spPr>
+          </p:nvGrpSpPr>
+          <p:grpSpPr>
             <a:xfrm>
-              <a:off x="2211345" y="2869852"/>
-              <a:ext cx="115452" cy="799249"/>
+              <a:off x="1025576" y="5601660"/>
+              <a:ext cx="1656168" cy="691558"/>
+              <a:chOff x="1021307" y="2869852"/>
+              <a:chExt cx="1616324" cy="799249"/>
             </a:xfrm>
-            <a:prstGeom prst="leftBrace">
-              <a:avLst/>
-            </a:prstGeom>
-          </p:spPr>
-          <p:style>
-            <a:lnRef idx="2">
-              <a:schemeClr val="accent1"/>
-            </a:lnRef>
-            <a:fillRef idx="0">
-              <a:schemeClr val="accent1"/>
-            </a:fillRef>
-            <a:effectRef idx="1">
-              <a:schemeClr val="accent1"/>
-            </a:effectRef>
-            <a:fontRef idx="minor">
-              <a:schemeClr val="tx1"/>
-            </a:fontRef>
-          </p:style>
-          <p:txBody>
-            <a:bodyPr rtlCol="0" anchor="ctr"/>
-            <a:lstStyle/>
-            <a:p>
-              <a:pPr algn="ctr"/>
-              <a:endParaRPr lang="fr-FR"/>
-            </a:p>
-          </p:txBody>
-        </p:sp>
-        <p:sp>
-          <p:nvSpPr>
-            <p:cNvPr id="18" name="ZoneTexte 17"/>
-            <p:cNvSpPr txBox="1"/>
+          </p:grpSpPr>
+          <p:sp>
+            <p:nvSpPr>
+              <p:cNvPr id="21" name="Accolade ouvrante 20"/>
+              <p:cNvSpPr/>
+              <p:nvPr/>
+            </p:nvSpPr>
+            <p:spPr>
+              <a:xfrm>
+                <a:off x="2211345" y="2869852"/>
+                <a:ext cx="115452" cy="799249"/>
+              </a:xfrm>
+              <a:prstGeom prst="leftBrace">
+                <a:avLst/>
+              </a:prstGeom>
+            </p:spPr>
+            <p:style>
+              <a:lnRef idx="2">
+                <a:schemeClr val="accent1"/>
+              </a:lnRef>
+              <a:fillRef idx="0">
+                <a:schemeClr val="accent1"/>
+              </a:fillRef>
+              <a:effectRef idx="1">
+                <a:schemeClr val="accent1"/>
+              </a:effectRef>
+              <a:fontRef idx="minor">
+                <a:schemeClr val="tx1"/>
+              </a:fontRef>
+            </p:style>
+            <p:txBody>
+              <a:bodyPr rtlCol="0" anchor="ctr"/>
+              <a:lstStyle/>
+              <a:p>
+                <a:pPr algn="ctr"/>
+                <a:endParaRPr lang="fr-FR"/>
+              </a:p>
+            </p:txBody>
+          </p:sp>
+          <p:sp>
+            <p:nvSpPr>
+              <p:cNvPr id="22" name="ZoneTexte 21"/>
+              <p:cNvSpPr txBox="1"/>
+              <p:nvPr/>
+            </p:nvSpPr>
+            <p:spPr>
+              <a:xfrm>
+                <a:off x="1021307" y="3139856"/>
+                <a:ext cx="1616324" cy="320134"/>
+              </a:xfrm>
+              <a:prstGeom prst="rect">
+                <a:avLst/>
+              </a:prstGeom>
+              <a:noFill/>
+            </p:spPr>
+            <p:txBody>
+              <a:bodyPr wrap="square" rtlCol="0">
+                <a:spAutoFit/>
+              </a:bodyPr>
+              <a:lstStyle/>
+              <a:p>
+                <a:r>
+                  <a:rPr lang="fr-FR" sz="1200" dirty="0" smtClean="0"/>
+                  <a:t>Gold Standard 6</a:t>
+                </a:r>
+                <a:endParaRPr lang="fr-FR" sz="1200" dirty="0"/>
+              </a:p>
+            </p:txBody>
+          </p:sp>
+        </p:grpSp>
+        <p:grpSp>
+          <p:nvGrpSpPr>
+            <p:cNvPr id="23" name="Grouper 22"/>
+            <p:cNvGrpSpPr/>
             <p:nvPr/>
-          </p:nvSpPr>
-          <p:spPr>
+          </p:nvGrpSpPr>
+          <p:grpSpPr>
             <a:xfrm>
-              <a:off x="1021307" y="3139857"/>
-              <a:ext cx="1616324" cy="276999"/>
+              <a:off x="1013849" y="1966533"/>
+              <a:ext cx="1656168" cy="691558"/>
+              <a:chOff x="1021307" y="2869852"/>
+              <a:chExt cx="1616324" cy="799249"/>
             </a:xfrm>
-            <a:prstGeom prst="rect">
-              <a:avLst/>
-            </a:prstGeom>
-            <a:noFill/>
-          </p:spPr>
-          <p:txBody>
-            <a:bodyPr wrap="square" rtlCol="0">
-              <a:spAutoFit/>
-            </a:bodyPr>
-            <a:lstStyle/>
-            <a:p>
-              <a:r>
-                <a:rPr lang="fr-FR" sz="1200" dirty="0" smtClean="0"/>
-                <a:t>Gold Standard 5</a:t>
-              </a:r>
-              <a:endParaRPr lang="fr-FR" sz="1200" dirty="0"/>
-            </a:p>
-          </p:txBody>
-        </p:sp>
-      </p:grpSp>
-      <p:grpSp>
-        <p:nvGrpSpPr>
-          <p:cNvPr id="20" name="Grouper 19"/>
-          <p:cNvGrpSpPr/>
-          <p:nvPr/>
-        </p:nvGrpSpPr>
-        <p:grpSpPr>
-          <a:xfrm>
-            <a:off x="1025576" y="5601660"/>
-            <a:ext cx="1656168" cy="691558"/>
-            <a:chOff x="1021307" y="2869852"/>
-            <a:chExt cx="1616324" cy="799249"/>
-          </a:xfrm>
-        </p:grpSpPr>
-        <p:sp>
-          <p:nvSpPr>
-            <p:cNvPr id="21" name="Accolade ouvrante 20"/>
-            <p:cNvSpPr/>
+          </p:grpSpPr>
+          <p:sp>
+            <p:nvSpPr>
+              <p:cNvPr id="24" name="Accolade ouvrante 23"/>
+              <p:cNvSpPr/>
+              <p:nvPr/>
+            </p:nvSpPr>
+            <p:spPr>
+              <a:xfrm>
+                <a:off x="2211345" y="2869852"/>
+                <a:ext cx="115452" cy="799249"/>
+              </a:xfrm>
+              <a:prstGeom prst="leftBrace">
+                <a:avLst/>
+              </a:prstGeom>
+            </p:spPr>
+            <p:style>
+              <a:lnRef idx="2">
+                <a:schemeClr val="accent1"/>
+              </a:lnRef>
+              <a:fillRef idx="0">
+                <a:schemeClr val="accent1"/>
+              </a:fillRef>
+              <a:effectRef idx="1">
+                <a:schemeClr val="accent1"/>
+              </a:effectRef>
+              <a:fontRef idx="minor">
+                <a:schemeClr val="tx1"/>
+              </a:fontRef>
+            </p:style>
+            <p:txBody>
+              <a:bodyPr rtlCol="0" anchor="ctr"/>
+              <a:lstStyle/>
+              <a:p>
+                <a:pPr algn="ctr"/>
+                <a:endParaRPr lang="fr-FR"/>
+              </a:p>
+            </p:txBody>
+          </p:sp>
+          <p:sp>
+            <p:nvSpPr>
+              <p:cNvPr id="25" name="ZoneTexte 24"/>
+              <p:cNvSpPr txBox="1"/>
+              <p:nvPr/>
+            </p:nvSpPr>
+            <p:spPr>
+              <a:xfrm>
+                <a:off x="1021307" y="3139856"/>
+                <a:ext cx="1616324" cy="320134"/>
+              </a:xfrm>
+              <a:prstGeom prst="rect">
+                <a:avLst/>
+              </a:prstGeom>
+              <a:noFill/>
+            </p:spPr>
+            <p:txBody>
+              <a:bodyPr wrap="square" rtlCol="0">
+                <a:spAutoFit/>
+              </a:bodyPr>
+              <a:lstStyle/>
+              <a:p>
+                <a:r>
+                  <a:rPr lang="fr-FR" sz="1200" dirty="0" smtClean="0"/>
+                  <a:t>Gold Standard 1</a:t>
+                </a:r>
+                <a:endParaRPr lang="fr-FR" sz="1200" dirty="0"/>
+              </a:p>
+            </p:txBody>
+          </p:sp>
+        </p:grpSp>
+        <p:grpSp>
+          <p:nvGrpSpPr>
+            <p:cNvPr id="27" name="Grouper 26"/>
+            <p:cNvGrpSpPr/>
             <p:nvPr/>
-          </p:nvSpPr>
-          <p:spPr>
+          </p:nvGrpSpPr>
+          <p:grpSpPr>
             <a:xfrm>
-              <a:off x="2211345" y="2869852"/>
-              <a:ext cx="115452" cy="799249"/>
+              <a:off x="6340969" y="6521722"/>
+              <a:ext cx="694001" cy="336892"/>
+              <a:chOff x="6340969" y="6521722"/>
+              <a:chExt cx="694001" cy="336892"/>
             </a:xfrm>
-            <a:prstGeom prst="leftBrace">
-              <a:avLst/>
-            </a:prstGeom>
-          </p:spPr>
-          <p:style>
-            <a:lnRef idx="2">
-              <a:schemeClr val="accent1"/>
-            </a:lnRef>
-            <a:fillRef idx="0">
-              <a:schemeClr val="accent1"/>
-            </a:fillRef>
-            <a:effectRef idx="1">
-              <a:schemeClr val="accent1"/>
-            </a:effectRef>
-            <a:fontRef idx="minor">
-              <a:schemeClr val="tx1"/>
-            </a:fontRef>
-          </p:style>
-          <p:txBody>
-            <a:bodyPr rtlCol="0" anchor="ctr"/>
-            <a:lstStyle/>
-            <a:p>
-              <a:pPr algn="ctr"/>
-              <a:endParaRPr lang="fr-FR"/>
-            </a:p>
-          </p:txBody>
-        </p:sp>
-        <p:sp>
-          <p:nvSpPr>
-            <p:cNvPr id="22" name="ZoneTexte 21"/>
-            <p:cNvSpPr txBox="1"/>
+          </p:grpSpPr>
+          <p:sp>
+            <p:nvSpPr>
+              <p:cNvPr id="19" name="Accolade ouvrante 18"/>
+              <p:cNvSpPr/>
+              <p:nvPr/>
+            </p:nvSpPr>
+            <p:spPr>
+              <a:xfrm rot="16200000">
+                <a:off x="6631948" y="6230743"/>
+                <a:ext cx="112044" cy="694001"/>
+              </a:xfrm>
+              <a:prstGeom prst="leftBrace">
+                <a:avLst/>
+              </a:prstGeom>
+            </p:spPr>
+            <p:style>
+              <a:lnRef idx="2">
+                <a:schemeClr val="accent1"/>
+              </a:lnRef>
+              <a:fillRef idx="0">
+                <a:schemeClr val="accent1"/>
+              </a:fillRef>
+              <a:effectRef idx="1">
+                <a:schemeClr val="accent1"/>
+              </a:effectRef>
+              <a:fontRef idx="minor">
+                <a:schemeClr val="tx1"/>
+              </a:fontRef>
+            </p:style>
+            <p:txBody>
+              <a:bodyPr rtlCol="0" anchor="ctr"/>
+              <a:lstStyle/>
+              <a:p>
+                <a:pPr algn="ctr"/>
+                <a:endParaRPr lang="fr-FR"/>
+              </a:p>
+            </p:txBody>
+          </p:sp>
+          <p:sp>
+            <p:nvSpPr>
+              <p:cNvPr id="26" name="ZoneTexte 25"/>
+              <p:cNvSpPr txBox="1"/>
+              <p:nvPr/>
+            </p:nvSpPr>
+            <p:spPr>
+              <a:xfrm>
+                <a:off x="6396776" y="6581615"/>
+                <a:ext cx="602671" cy="276999"/>
+              </a:xfrm>
+              <a:prstGeom prst="rect">
+                <a:avLst/>
+              </a:prstGeom>
+              <a:noFill/>
+            </p:spPr>
+            <p:txBody>
+              <a:bodyPr wrap="square" rtlCol="0">
+                <a:spAutoFit/>
+              </a:bodyPr>
+              <a:lstStyle/>
+              <a:p>
+                <a:pPr algn="ctr"/>
+                <a:r>
+                  <a:rPr lang="fr-FR" sz="1200" dirty="0" smtClean="0"/>
+                  <a:t>GS 6</a:t>
+                </a:r>
+                <a:endParaRPr lang="fr-FR" sz="1200" dirty="0"/>
+              </a:p>
+            </p:txBody>
+          </p:sp>
+        </p:grpSp>
+        <p:grpSp>
+          <p:nvGrpSpPr>
+            <p:cNvPr id="28" name="Grouper 27"/>
+            <p:cNvGrpSpPr/>
             <p:nvPr/>
-          </p:nvSpPr>
-          <p:spPr>
+          </p:nvGrpSpPr>
+          <p:grpSpPr>
             <a:xfrm>
-              <a:off x="1021307" y="3139856"/>
-              <a:ext cx="1616324" cy="320134"/>
+              <a:off x="5596388" y="6523145"/>
+              <a:ext cx="694001" cy="336892"/>
+              <a:chOff x="6340969" y="6521722"/>
+              <a:chExt cx="694001" cy="336892"/>
             </a:xfrm>
-            <a:prstGeom prst="rect">
-              <a:avLst/>
-            </a:prstGeom>
-            <a:noFill/>
-          </p:spPr>
-          <p:txBody>
-            <a:bodyPr wrap="square" rtlCol="0">
-              <a:spAutoFit/>
-            </a:bodyPr>
-            <a:lstStyle/>
-            <a:p>
-              <a:r>
-                <a:rPr lang="fr-FR" sz="1200" dirty="0" smtClean="0"/>
-                <a:t>Gold Standard 6</a:t>
-              </a:r>
-              <a:endParaRPr lang="fr-FR" sz="1200" dirty="0"/>
-            </a:p>
-          </p:txBody>
-        </p:sp>
-      </p:grpSp>
-      <p:grpSp>
-        <p:nvGrpSpPr>
-          <p:cNvPr id="23" name="Grouper 22"/>
-          <p:cNvGrpSpPr/>
-          <p:nvPr/>
-        </p:nvGrpSpPr>
-        <p:grpSpPr>
-          <a:xfrm>
-            <a:off x="1013849" y="1966533"/>
-            <a:ext cx="1656168" cy="691558"/>
-            <a:chOff x="1021307" y="2869852"/>
-            <a:chExt cx="1616324" cy="799249"/>
-          </a:xfrm>
-        </p:grpSpPr>
-        <p:sp>
-          <p:nvSpPr>
-            <p:cNvPr id="24" name="Accolade ouvrante 23"/>
-            <p:cNvSpPr/>
+          </p:grpSpPr>
+          <p:sp>
+            <p:nvSpPr>
+              <p:cNvPr id="29" name="Accolade ouvrante 28"/>
+              <p:cNvSpPr/>
+              <p:nvPr/>
+            </p:nvSpPr>
+            <p:spPr>
+              <a:xfrm rot="16200000">
+                <a:off x="6631948" y="6230743"/>
+                <a:ext cx="112044" cy="694001"/>
+              </a:xfrm>
+              <a:prstGeom prst="leftBrace">
+                <a:avLst/>
+              </a:prstGeom>
+            </p:spPr>
+            <p:style>
+              <a:lnRef idx="2">
+                <a:schemeClr val="accent1"/>
+              </a:lnRef>
+              <a:fillRef idx="0">
+                <a:schemeClr val="accent1"/>
+              </a:fillRef>
+              <a:effectRef idx="1">
+                <a:schemeClr val="accent1"/>
+              </a:effectRef>
+              <a:fontRef idx="minor">
+                <a:schemeClr val="tx1"/>
+              </a:fontRef>
+            </p:style>
+            <p:txBody>
+              <a:bodyPr rtlCol="0" anchor="ctr"/>
+              <a:lstStyle/>
+              <a:p>
+                <a:pPr algn="ctr"/>
+                <a:endParaRPr lang="fr-FR"/>
+              </a:p>
+            </p:txBody>
+          </p:sp>
+          <p:sp>
+            <p:nvSpPr>
+              <p:cNvPr id="30" name="ZoneTexte 29"/>
+              <p:cNvSpPr txBox="1"/>
+              <p:nvPr/>
+            </p:nvSpPr>
+            <p:spPr>
+              <a:xfrm>
+                <a:off x="6396776" y="6581615"/>
+                <a:ext cx="602671" cy="276999"/>
+              </a:xfrm>
+              <a:prstGeom prst="rect">
+                <a:avLst/>
+              </a:prstGeom>
+              <a:noFill/>
+            </p:spPr>
+            <p:txBody>
+              <a:bodyPr wrap="square" rtlCol="0">
+                <a:spAutoFit/>
+              </a:bodyPr>
+              <a:lstStyle/>
+              <a:p>
+                <a:pPr algn="ctr"/>
+                <a:r>
+                  <a:rPr lang="fr-FR" sz="1200" dirty="0" smtClean="0"/>
+                  <a:t>GS 5</a:t>
+                </a:r>
+                <a:endParaRPr lang="fr-FR" sz="1200" dirty="0"/>
+              </a:p>
+            </p:txBody>
+          </p:sp>
+        </p:grpSp>
+        <p:grpSp>
+          <p:nvGrpSpPr>
+            <p:cNvPr id="31" name="Grouper 30"/>
+            <p:cNvGrpSpPr/>
             <p:nvPr/>
-          </p:nvSpPr>
-          <p:spPr>
+          </p:nvGrpSpPr>
+          <p:grpSpPr>
             <a:xfrm>
-              <a:off x="2211345" y="2869852"/>
-              <a:ext cx="115452" cy="799249"/>
+              <a:off x="4851807" y="6524568"/>
+              <a:ext cx="694001" cy="336892"/>
+              <a:chOff x="6340969" y="6521722"/>
+              <a:chExt cx="694001" cy="336892"/>
             </a:xfrm>
-            <a:prstGeom prst="leftBrace">
-              <a:avLst/>
-            </a:prstGeom>
-          </p:spPr>
-          <p:style>
-            <a:lnRef idx="2">
-              <a:schemeClr val="accent1"/>
-            </a:lnRef>
-            <a:fillRef idx="0">
-              <a:schemeClr val="accent1"/>
-            </a:fillRef>
-            <a:effectRef idx="1">
-              <a:schemeClr val="accent1"/>
-            </a:effectRef>
-            <a:fontRef idx="minor">
-              <a:schemeClr val="tx1"/>
-            </a:fontRef>
-          </p:style>
-          <p:txBody>
-            <a:bodyPr rtlCol="0" anchor="ctr"/>
-            <a:lstStyle/>
-            <a:p>
-              <a:pPr algn="ctr"/>
-              <a:endParaRPr lang="fr-FR"/>
-            </a:p>
-          </p:txBody>
-        </p:sp>
-        <p:sp>
-          <p:nvSpPr>
-            <p:cNvPr id="25" name="ZoneTexte 24"/>
-            <p:cNvSpPr txBox="1"/>
+          </p:grpSpPr>
+          <p:sp>
+            <p:nvSpPr>
+              <p:cNvPr id="32" name="Accolade ouvrante 31"/>
+              <p:cNvSpPr/>
+              <p:nvPr/>
+            </p:nvSpPr>
+            <p:spPr>
+              <a:xfrm rot="16200000">
+                <a:off x="6631948" y="6230743"/>
+                <a:ext cx="112044" cy="694001"/>
+              </a:xfrm>
+              <a:prstGeom prst="leftBrace">
+                <a:avLst/>
+              </a:prstGeom>
+            </p:spPr>
+            <p:style>
+              <a:lnRef idx="2">
+                <a:schemeClr val="accent1"/>
+              </a:lnRef>
+              <a:fillRef idx="0">
+                <a:schemeClr val="accent1"/>
+              </a:fillRef>
+              <a:effectRef idx="1">
+                <a:schemeClr val="accent1"/>
+              </a:effectRef>
+              <a:fontRef idx="minor">
+                <a:schemeClr val="tx1"/>
+              </a:fontRef>
+            </p:style>
+            <p:txBody>
+              <a:bodyPr rtlCol="0" anchor="ctr"/>
+              <a:lstStyle/>
+              <a:p>
+                <a:pPr algn="ctr"/>
+                <a:endParaRPr lang="fr-FR"/>
+              </a:p>
+            </p:txBody>
+          </p:sp>
+          <p:sp>
+            <p:nvSpPr>
+              <p:cNvPr id="33" name="ZoneTexte 32"/>
+              <p:cNvSpPr txBox="1"/>
+              <p:nvPr/>
+            </p:nvSpPr>
+            <p:spPr>
+              <a:xfrm>
+                <a:off x="6396776" y="6581615"/>
+                <a:ext cx="602671" cy="276999"/>
+              </a:xfrm>
+              <a:prstGeom prst="rect">
+                <a:avLst/>
+              </a:prstGeom>
+              <a:noFill/>
+            </p:spPr>
+            <p:txBody>
+              <a:bodyPr wrap="square" rtlCol="0">
+                <a:spAutoFit/>
+              </a:bodyPr>
+              <a:lstStyle/>
+              <a:p>
+                <a:pPr algn="ctr"/>
+                <a:r>
+                  <a:rPr lang="fr-FR" sz="1200" dirty="0" smtClean="0"/>
+                  <a:t>GS 4</a:t>
+                </a:r>
+                <a:endParaRPr lang="fr-FR" sz="1200" dirty="0"/>
+              </a:p>
+            </p:txBody>
+          </p:sp>
+        </p:grpSp>
+        <p:grpSp>
+          <p:nvGrpSpPr>
+            <p:cNvPr id="34" name="Grouper 33"/>
+            <p:cNvGrpSpPr/>
             <p:nvPr/>
-          </p:nvSpPr>
-          <p:spPr>
+          </p:nvGrpSpPr>
+          <p:grpSpPr>
             <a:xfrm>
-              <a:off x="1021307" y="3139856"/>
-              <a:ext cx="1616324" cy="320134"/>
+              <a:off x="4116107" y="6525991"/>
+              <a:ext cx="694001" cy="336892"/>
+              <a:chOff x="6340969" y="6521722"/>
+              <a:chExt cx="694001" cy="336892"/>
             </a:xfrm>
-            <a:prstGeom prst="rect">
-              <a:avLst/>
-            </a:prstGeom>
-            <a:noFill/>
-          </p:spPr>
-          <p:txBody>
-            <a:bodyPr wrap="square" rtlCol="0">
-              <a:spAutoFit/>
-            </a:bodyPr>
-            <a:lstStyle/>
-            <a:p>
-              <a:r>
-                <a:rPr lang="fr-FR" sz="1200" dirty="0" smtClean="0"/>
-                <a:t>Gold Standard 1</a:t>
-              </a:r>
-              <a:endParaRPr lang="fr-FR" sz="1200" dirty="0"/>
-            </a:p>
-          </p:txBody>
-        </p:sp>
-      </p:grpSp>
-      <p:grpSp>
-        <p:nvGrpSpPr>
-          <p:cNvPr id="27" name="Grouper 26"/>
-          <p:cNvGrpSpPr/>
-          <p:nvPr/>
-        </p:nvGrpSpPr>
-        <p:grpSpPr>
-          <a:xfrm>
-            <a:off x="6340969" y="6521722"/>
-            <a:ext cx="694001" cy="336892"/>
-            <a:chOff x="6340969" y="6521722"/>
-            <a:chExt cx="694001" cy="336892"/>
-          </a:xfrm>
-        </p:grpSpPr>
-        <p:sp>
-          <p:nvSpPr>
-            <p:cNvPr id="19" name="Accolade ouvrante 18"/>
-            <p:cNvSpPr/>
+          </p:grpSpPr>
+          <p:sp>
+            <p:nvSpPr>
+              <p:cNvPr id="35" name="Accolade ouvrante 34"/>
+              <p:cNvSpPr/>
+              <p:nvPr/>
+            </p:nvSpPr>
+            <p:spPr>
+              <a:xfrm rot="16200000">
+                <a:off x="6631948" y="6230743"/>
+                <a:ext cx="112044" cy="694001"/>
+              </a:xfrm>
+              <a:prstGeom prst="leftBrace">
+                <a:avLst/>
+              </a:prstGeom>
+            </p:spPr>
+            <p:style>
+              <a:lnRef idx="2">
+                <a:schemeClr val="accent1"/>
+              </a:lnRef>
+              <a:fillRef idx="0">
+                <a:schemeClr val="accent1"/>
+              </a:fillRef>
+              <a:effectRef idx="1">
+                <a:schemeClr val="accent1"/>
+              </a:effectRef>
+              <a:fontRef idx="minor">
+                <a:schemeClr val="tx1"/>
+              </a:fontRef>
+            </p:style>
+            <p:txBody>
+              <a:bodyPr rtlCol="0" anchor="ctr"/>
+              <a:lstStyle/>
+              <a:p>
+                <a:pPr algn="ctr"/>
+                <a:endParaRPr lang="fr-FR"/>
+              </a:p>
+            </p:txBody>
+          </p:sp>
+          <p:sp>
+            <p:nvSpPr>
+              <p:cNvPr id="36" name="ZoneTexte 35"/>
+              <p:cNvSpPr txBox="1"/>
+              <p:nvPr/>
+            </p:nvSpPr>
+            <p:spPr>
+              <a:xfrm>
+                <a:off x="6396776" y="6581615"/>
+                <a:ext cx="602671" cy="276999"/>
+              </a:xfrm>
+              <a:prstGeom prst="rect">
+                <a:avLst/>
+              </a:prstGeom>
+              <a:noFill/>
+            </p:spPr>
+            <p:txBody>
+              <a:bodyPr wrap="square" rtlCol="0">
+                <a:spAutoFit/>
+              </a:bodyPr>
+              <a:lstStyle/>
+              <a:p>
+                <a:pPr algn="ctr"/>
+                <a:r>
+                  <a:rPr lang="fr-FR" sz="1200" dirty="0" smtClean="0"/>
+                  <a:t>GS 3</a:t>
+                </a:r>
+                <a:endParaRPr lang="fr-FR" sz="1200" dirty="0"/>
+              </a:p>
+            </p:txBody>
+          </p:sp>
+        </p:grpSp>
+        <p:grpSp>
+          <p:nvGrpSpPr>
+            <p:cNvPr id="37" name="Grouper 36"/>
+            <p:cNvGrpSpPr/>
             <p:nvPr/>
-          </p:nvSpPr>
-          <p:spPr>
-            <a:xfrm rot="16200000">
-              <a:off x="6631948" y="6230743"/>
-              <a:ext cx="112044" cy="694001"/>
+          </p:nvGrpSpPr>
+          <p:grpSpPr>
+            <a:xfrm>
+              <a:off x="3380407" y="6527414"/>
+              <a:ext cx="694001" cy="336892"/>
+              <a:chOff x="6340969" y="6521722"/>
+              <a:chExt cx="694001" cy="336892"/>
             </a:xfrm>
-            <a:prstGeom prst="leftBrace">
-              <a:avLst/>
-            </a:prstGeom>
-          </p:spPr>
-          <p:style>
-            <a:lnRef idx="2">
-              <a:schemeClr val="accent1"/>
-            </a:lnRef>
-            <a:fillRef idx="0">
-              <a:schemeClr val="accent1"/>
-            </a:fillRef>
-            <a:effectRef idx="1">
-              <a:schemeClr val="accent1"/>
-            </a:effectRef>
-            <a:fontRef idx="minor">
-              <a:schemeClr val="tx1"/>
-            </a:fontRef>
-          </p:style>
-          <p:txBody>
-            <a:bodyPr rtlCol="0" anchor="ctr"/>
-            <a:lstStyle/>
-            <a:p>
-              <a:pPr algn="ctr"/>
-              <a:endParaRPr lang="fr-FR"/>
-            </a:p>
-          </p:txBody>
-        </p:sp>
-        <p:sp>
-          <p:nvSpPr>
-            <p:cNvPr id="26" name="ZoneTexte 25"/>
-            <p:cNvSpPr txBox="1"/>
+          </p:grpSpPr>
+          <p:sp>
+            <p:nvSpPr>
+              <p:cNvPr id="38" name="Accolade ouvrante 37"/>
+              <p:cNvSpPr/>
+              <p:nvPr/>
+            </p:nvSpPr>
+            <p:spPr>
+              <a:xfrm rot="16200000">
+                <a:off x="6631948" y="6230743"/>
+                <a:ext cx="112044" cy="694001"/>
+              </a:xfrm>
+              <a:prstGeom prst="leftBrace">
+                <a:avLst/>
+              </a:prstGeom>
+            </p:spPr>
+            <p:style>
+              <a:lnRef idx="2">
+                <a:schemeClr val="accent1"/>
+              </a:lnRef>
+              <a:fillRef idx="0">
+                <a:schemeClr val="accent1"/>
+              </a:fillRef>
+              <a:effectRef idx="1">
+                <a:schemeClr val="accent1"/>
+              </a:effectRef>
+              <a:fontRef idx="minor">
+                <a:schemeClr val="tx1"/>
+              </a:fontRef>
+            </p:style>
+            <p:txBody>
+              <a:bodyPr rtlCol="0" anchor="ctr"/>
+              <a:lstStyle/>
+              <a:p>
+                <a:pPr algn="ctr"/>
+                <a:endParaRPr lang="fr-FR"/>
+              </a:p>
+            </p:txBody>
+          </p:sp>
+          <p:sp>
+            <p:nvSpPr>
+              <p:cNvPr id="39" name="ZoneTexte 38"/>
+              <p:cNvSpPr txBox="1"/>
+              <p:nvPr/>
+            </p:nvSpPr>
+            <p:spPr>
+              <a:xfrm>
+                <a:off x="6396776" y="6581615"/>
+                <a:ext cx="602671" cy="276999"/>
+              </a:xfrm>
+              <a:prstGeom prst="rect">
+                <a:avLst/>
+              </a:prstGeom>
+              <a:noFill/>
+            </p:spPr>
+            <p:txBody>
+              <a:bodyPr wrap="square" rtlCol="0">
+                <a:spAutoFit/>
+              </a:bodyPr>
+              <a:lstStyle/>
+              <a:p>
+                <a:pPr algn="ctr"/>
+                <a:r>
+                  <a:rPr lang="fr-FR" sz="1200" dirty="0" smtClean="0"/>
+                  <a:t>GS 2</a:t>
+                </a:r>
+                <a:endParaRPr lang="fr-FR" sz="1200" dirty="0"/>
+              </a:p>
+            </p:txBody>
+          </p:sp>
+        </p:grpSp>
+        <p:grpSp>
+          <p:nvGrpSpPr>
+            <p:cNvPr id="40" name="Grouper 39"/>
+            <p:cNvGrpSpPr/>
             <p:nvPr/>
-          </p:nvSpPr>
-          <p:spPr>
+          </p:nvGrpSpPr>
+          <p:grpSpPr>
             <a:xfrm>
-              <a:off x="6396776" y="6581615"/>
-              <a:ext cx="602671" cy="276999"/>
+              <a:off x="2653588" y="6528837"/>
+              <a:ext cx="694001" cy="336892"/>
+              <a:chOff x="6340969" y="6521722"/>
+              <a:chExt cx="694001" cy="336892"/>
             </a:xfrm>
-            <a:prstGeom prst="rect">
-              <a:avLst/>
-            </a:prstGeom>
-            <a:noFill/>
-          </p:spPr>
-          <p:txBody>
-            <a:bodyPr wrap="square" rtlCol="0">
-              <a:spAutoFit/>
-            </a:bodyPr>
-            <a:lstStyle/>
-            <a:p>
-              <a:pPr algn="ctr"/>
-              <a:r>
-                <a:rPr lang="fr-FR" sz="1200" dirty="0" smtClean="0"/>
-                <a:t>GS 6</a:t>
-              </a:r>
-              <a:endParaRPr lang="fr-FR" sz="1200" dirty="0"/>
-            </a:p>
-          </p:txBody>
-        </p:sp>
-      </p:grpSp>
-      <p:grpSp>
-        <p:nvGrpSpPr>
-          <p:cNvPr id="28" name="Grouper 27"/>
-          <p:cNvGrpSpPr/>
-          <p:nvPr/>
-        </p:nvGrpSpPr>
-        <p:grpSpPr>
-          <a:xfrm>
-            <a:off x="5596388" y="6523145"/>
-            <a:ext cx="694001" cy="336892"/>
-            <a:chOff x="6340969" y="6521722"/>
-            <a:chExt cx="694001" cy="336892"/>
-          </a:xfrm>
-        </p:grpSpPr>
-        <p:sp>
-          <p:nvSpPr>
-            <p:cNvPr id="29" name="Accolade ouvrante 28"/>
-            <p:cNvSpPr/>
-            <p:nvPr/>
-          </p:nvSpPr>
-          <p:spPr>
-            <a:xfrm rot="16200000">
-              <a:off x="6631948" y="6230743"/>
-              <a:ext cx="112044" cy="694001"/>
-            </a:xfrm>
-            <a:prstGeom prst="leftBrace">
-              <a:avLst/>
-            </a:prstGeom>
-          </p:spPr>
-          <p:style>
-            <a:lnRef idx="2">
-              <a:schemeClr val="accent1"/>
-            </a:lnRef>
-            <a:fillRef idx="0">
-              <a:schemeClr val="accent1"/>
-            </a:fillRef>
-            <a:effectRef idx="1">
-              <a:schemeClr val="accent1"/>
-            </a:effectRef>
-            <a:fontRef idx="minor">
-              <a:schemeClr val="tx1"/>
-            </a:fontRef>
-          </p:style>
-          <p:txBody>
-            <a:bodyPr rtlCol="0" anchor="ctr"/>
-            <a:lstStyle/>
-            <a:p>
-              <a:pPr algn="ctr"/>
-              <a:endParaRPr lang="fr-FR"/>
-            </a:p>
-          </p:txBody>
-        </p:sp>
-        <p:sp>
-          <p:nvSpPr>
-            <p:cNvPr id="30" name="ZoneTexte 29"/>
-            <p:cNvSpPr txBox="1"/>
-            <p:nvPr/>
-          </p:nvSpPr>
-          <p:spPr>
-            <a:xfrm>
-              <a:off x="6396776" y="6581615"/>
-              <a:ext cx="602671" cy="276999"/>
-            </a:xfrm>
-            <a:prstGeom prst="rect">
-              <a:avLst/>
-            </a:prstGeom>
-            <a:noFill/>
-          </p:spPr>
-          <p:txBody>
-            <a:bodyPr wrap="square" rtlCol="0">
-              <a:spAutoFit/>
-            </a:bodyPr>
-            <a:lstStyle/>
-            <a:p>
-              <a:pPr algn="ctr"/>
-              <a:r>
-                <a:rPr lang="fr-FR" sz="1200" dirty="0" smtClean="0"/>
-                <a:t>GS 5</a:t>
-              </a:r>
-              <a:endParaRPr lang="fr-FR" sz="1200" dirty="0"/>
-            </a:p>
-          </p:txBody>
-        </p:sp>
-      </p:grpSp>
-      <p:grpSp>
-        <p:nvGrpSpPr>
-          <p:cNvPr id="31" name="Grouper 30"/>
-          <p:cNvGrpSpPr/>
-          <p:nvPr/>
-        </p:nvGrpSpPr>
-        <p:grpSpPr>
-          <a:xfrm>
-            <a:off x="4851807" y="6524568"/>
-            <a:ext cx="694001" cy="336892"/>
-            <a:chOff x="6340969" y="6521722"/>
-            <a:chExt cx="694001" cy="336892"/>
-          </a:xfrm>
-        </p:grpSpPr>
-        <p:sp>
-          <p:nvSpPr>
-            <p:cNvPr id="32" name="Accolade ouvrante 31"/>
-            <p:cNvSpPr/>
-            <p:nvPr/>
-          </p:nvSpPr>
-          <p:spPr>
-            <a:xfrm rot="16200000">
-              <a:off x="6631948" y="6230743"/>
-              <a:ext cx="112044" cy="694001"/>
-            </a:xfrm>
-            <a:prstGeom prst="leftBrace">
-              <a:avLst/>
-            </a:prstGeom>
-          </p:spPr>
-          <p:style>
-            <a:lnRef idx="2">
-              <a:schemeClr val="accent1"/>
-            </a:lnRef>
-            <a:fillRef idx="0">
-              <a:schemeClr val="accent1"/>
-            </a:fillRef>
-            <a:effectRef idx="1">
-              <a:schemeClr val="accent1"/>
-            </a:effectRef>
-            <a:fontRef idx="minor">
-              <a:schemeClr val="tx1"/>
-            </a:fontRef>
-          </p:style>
-          <p:txBody>
-            <a:bodyPr rtlCol="0" anchor="ctr"/>
-            <a:lstStyle/>
-            <a:p>
-              <a:pPr algn="ctr"/>
-              <a:endParaRPr lang="fr-FR"/>
-            </a:p>
-          </p:txBody>
-        </p:sp>
-        <p:sp>
-          <p:nvSpPr>
-            <p:cNvPr id="33" name="ZoneTexte 32"/>
-            <p:cNvSpPr txBox="1"/>
-            <p:nvPr/>
-          </p:nvSpPr>
-          <p:spPr>
-            <a:xfrm>
-              <a:off x="6396776" y="6581615"/>
-              <a:ext cx="602671" cy="276999"/>
-            </a:xfrm>
-            <a:prstGeom prst="rect">
-              <a:avLst/>
-            </a:prstGeom>
-            <a:noFill/>
-          </p:spPr>
-          <p:txBody>
-            <a:bodyPr wrap="square" rtlCol="0">
-              <a:spAutoFit/>
-            </a:bodyPr>
-            <a:lstStyle/>
-            <a:p>
-              <a:pPr algn="ctr"/>
-              <a:r>
-                <a:rPr lang="fr-FR" sz="1200" dirty="0" smtClean="0"/>
-                <a:t>GS 4</a:t>
-              </a:r>
-              <a:endParaRPr lang="fr-FR" sz="1200" dirty="0"/>
-            </a:p>
-          </p:txBody>
-        </p:sp>
-      </p:grpSp>
-      <p:grpSp>
-        <p:nvGrpSpPr>
-          <p:cNvPr id="34" name="Grouper 33"/>
-          <p:cNvGrpSpPr/>
-          <p:nvPr/>
-        </p:nvGrpSpPr>
-        <p:grpSpPr>
-          <a:xfrm>
-            <a:off x="4116107" y="6525991"/>
-            <a:ext cx="694001" cy="336892"/>
-            <a:chOff x="6340969" y="6521722"/>
-            <a:chExt cx="694001" cy="336892"/>
-          </a:xfrm>
-        </p:grpSpPr>
-        <p:sp>
-          <p:nvSpPr>
-            <p:cNvPr id="35" name="Accolade ouvrante 34"/>
-            <p:cNvSpPr/>
-            <p:nvPr/>
-          </p:nvSpPr>
-          <p:spPr>
-            <a:xfrm rot="16200000">
-              <a:off x="6631948" y="6230743"/>
-              <a:ext cx="112044" cy="694001"/>
-            </a:xfrm>
-            <a:prstGeom prst="leftBrace">
-              <a:avLst/>
-            </a:prstGeom>
-          </p:spPr>
-          <p:style>
-            <a:lnRef idx="2">
-              <a:schemeClr val="accent1"/>
-            </a:lnRef>
-            <a:fillRef idx="0">
-              <a:schemeClr val="accent1"/>
-            </a:fillRef>
-            <a:effectRef idx="1">
-              <a:schemeClr val="accent1"/>
-            </a:effectRef>
-            <a:fontRef idx="minor">
-              <a:schemeClr val="tx1"/>
-            </a:fontRef>
-          </p:style>
-          <p:txBody>
-            <a:bodyPr rtlCol="0" anchor="ctr"/>
-            <a:lstStyle/>
-            <a:p>
-              <a:pPr algn="ctr"/>
-              <a:endParaRPr lang="fr-FR"/>
-            </a:p>
-          </p:txBody>
-        </p:sp>
-        <p:sp>
-          <p:nvSpPr>
-            <p:cNvPr id="36" name="ZoneTexte 35"/>
-            <p:cNvSpPr txBox="1"/>
-            <p:nvPr/>
-          </p:nvSpPr>
-          <p:spPr>
-            <a:xfrm>
-              <a:off x="6396776" y="6581615"/>
-              <a:ext cx="602671" cy="276999"/>
-            </a:xfrm>
-            <a:prstGeom prst="rect">
-              <a:avLst/>
-            </a:prstGeom>
-            <a:noFill/>
-          </p:spPr>
-          <p:txBody>
-            <a:bodyPr wrap="square" rtlCol="0">
-              <a:spAutoFit/>
-            </a:bodyPr>
-            <a:lstStyle/>
-            <a:p>
-              <a:pPr algn="ctr"/>
-              <a:r>
-                <a:rPr lang="fr-FR" sz="1200" dirty="0" smtClean="0"/>
-                <a:t>GS 3</a:t>
-              </a:r>
-              <a:endParaRPr lang="fr-FR" sz="1200" dirty="0"/>
-            </a:p>
-          </p:txBody>
-        </p:sp>
-      </p:grpSp>
-      <p:grpSp>
-        <p:nvGrpSpPr>
-          <p:cNvPr id="37" name="Grouper 36"/>
-          <p:cNvGrpSpPr/>
-          <p:nvPr/>
-        </p:nvGrpSpPr>
-        <p:grpSpPr>
-          <a:xfrm>
-            <a:off x="3380407" y="6527414"/>
-            <a:ext cx="694001" cy="336892"/>
-            <a:chOff x="6340969" y="6521722"/>
-            <a:chExt cx="694001" cy="336892"/>
-          </a:xfrm>
-        </p:grpSpPr>
-        <p:sp>
-          <p:nvSpPr>
-            <p:cNvPr id="38" name="Accolade ouvrante 37"/>
-            <p:cNvSpPr/>
-            <p:nvPr/>
-          </p:nvSpPr>
-          <p:spPr>
-            <a:xfrm rot="16200000">
-              <a:off x="6631948" y="6230743"/>
-              <a:ext cx="112044" cy="694001"/>
-            </a:xfrm>
-            <a:prstGeom prst="leftBrace">
-              <a:avLst/>
-            </a:prstGeom>
-          </p:spPr>
-          <p:style>
-            <a:lnRef idx="2">
-              <a:schemeClr val="accent1"/>
-            </a:lnRef>
-            <a:fillRef idx="0">
-              <a:schemeClr val="accent1"/>
-            </a:fillRef>
-            <a:effectRef idx="1">
-              <a:schemeClr val="accent1"/>
-            </a:effectRef>
-            <a:fontRef idx="minor">
-              <a:schemeClr val="tx1"/>
-            </a:fontRef>
-          </p:style>
-          <p:txBody>
-            <a:bodyPr rtlCol="0" anchor="ctr"/>
-            <a:lstStyle/>
-            <a:p>
-              <a:pPr algn="ctr"/>
-              <a:endParaRPr lang="fr-FR"/>
-            </a:p>
-          </p:txBody>
-        </p:sp>
-        <p:sp>
-          <p:nvSpPr>
-            <p:cNvPr id="39" name="ZoneTexte 38"/>
-            <p:cNvSpPr txBox="1"/>
-            <p:nvPr/>
-          </p:nvSpPr>
-          <p:spPr>
-            <a:xfrm>
-              <a:off x="6396776" y="6581615"/>
-              <a:ext cx="602671" cy="276999"/>
-            </a:xfrm>
-            <a:prstGeom prst="rect">
-              <a:avLst/>
-            </a:prstGeom>
-            <a:noFill/>
-          </p:spPr>
-          <p:txBody>
-            <a:bodyPr wrap="square" rtlCol="0">
-              <a:spAutoFit/>
-            </a:bodyPr>
-            <a:lstStyle/>
-            <a:p>
-              <a:pPr algn="ctr"/>
-              <a:r>
-                <a:rPr lang="fr-FR" sz="1200" dirty="0" smtClean="0"/>
-                <a:t>GS 2</a:t>
-              </a:r>
-              <a:endParaRPr lang="fr-FR" sz="1200" dirty="0"/>
-            </a:p>
-          </p:txBody>
-        </p:sp>
-      </p:grpSp>
-      <p:grpSp>
-        <p:nvGrpSpPr>
-          <p:cNvPr id="40" name="Grouper 39"/>
-          <p:cNvGrpSpPr/>
-          <p:nvPr/>
-        </p:nvGrpSpPr>
-        <p:grpSpPr>
-          <a:xfrm>
-            <a:off x="2653588" y="6528837"/>
-            <a:ext cx="694001" cy="336892"/>
-            <a:chOff x="6340969" y="6521722"/>
-            <a:chExt cx="694001" cy="336892"/>
-          </a:xfrm>
-        </p:grpSpPr>
-        <p:sp>
-          <p:nvSpPr>
-            <p:cNvPr id="41" name="Accolade ouvrante 40"/>
-            <p:cNvSpPr/>
-            <p:nvPr/>
-          </p:nvSpPr>
-          <p:spPr>
-            <a:xfrm rot="16200000">
-              <a:off x="6631948" y="6230743"/>
-              <a:ext cx="112044" cy="694001"/>
-            </a:xfrm>
-            <a:prstGeom prst="leftBrace">
-              <a:avLst/>
-            </a:prstGeom>
-          </p:spPr>
-          <p:style>
-            <a:lnRef idx="2">
-              <a:schemeClr val="accent1"/>
-            </a:lnRef>
-            <a:fillRef idx="0">
-              <a:schemeClr val="accent1"/>
-            </a:fillRef>
-            <a:effectRef idx="1">
-              <a:schemeClr val="accent1"/>
-            </a:effectRef>
-            <a:fontRef idx="minor">
-              <a:schemeClr val="tx1"/>
-            </a:fontRef>
-          </p:style>
-          <p:txBody>
-            <a:bodyPr rtlCol="0" anchor="ctr"/>
-            <a:lstStyle/>
-            <a:p>
-              <a:pPr algn="ctr"/>
-              <a:endParaRPr lang="fr-FR"/>
-            </a:p>
-          </p:txBody>
-        </p:sp>
-        <p:sp>
-          <p:nvSpPr>
-            <p:cNvPr id="42" name="ZoneTexte 41"/>
-            <p:cNvSpPr txBox="1"/>
-            <p:nvPr/>
-          </p:nvSpPr>
-          <p:spPr>
-            <a:xfrm>
-              <a:off x="6396776" y="6581615"/>
-              <a:ext cx="602671" cy="276999"/>
-            </a:xfrm>
-            <a:prstGeom prst="rect">
-              <a:avLst/>
-            </a:prstGeom>
-            <a:noFill/>
-          </p:spPr>
-          <p:txBody>
-            <a:bodyPr wrap="square" rtlCol="0">
-              <a:spAutoFit/>
-            </a:bodyPr>
-            <a:lstStyle/>
-            <a:p>
-              <a:pPr algn="ctr"/>
-              <a:r>
-                <a:rPr lang="fr-FR" sz="1200" dirty="0" smtClean="0"/>
-                <a:t>GS 1</a:t>
-              </a:r>
-              <a:endParaRPr lang="fr-FR" sz="1200" dirty="0"/>
-            </a:p>
-          </p:txBody>
-        </p:sp>
+          </p:grpSpPr>
+          <p:sp>
+            <p:nvSpPr>
+              <p:cNvPr id="41" name="Accolade ouvrante 40"/>
+              <p:cNvSpPr/>
+              <p:nvPr/>
+            </p:nvSpPr>
+            <p:spPr>
+              <a:xfrm rot="16200000">
+                <a:off x="6631948" y="6230743"/>
+                <a:ext cx="112044" cy="694001"/>
+              </a:xfrm>
+              <a:prstGeom prst="leftBrace">
+                <a:avLst/>
+              </a:prstGeom>
+            </p:spPr>
+            <p:style>
+              <a:lnRef idx="2">
+                <a:schemeClr val="accent1"/>
+              </a:lnRef>
+              <a:fillRef idx="0">
+                <a:schemeClr val="accent1"/>
+              </a:fillRef>
+              <a:effectRef idx="1">
+                <a:schemeClr val="accent1"/>
+              </a:effectRef>
+              <a:fontRef idx="minor">
+                <a:schemeClr val="tx1"/>
+              </a:fontRef>
+            </p:style>
+            <p:txBody>
+              <a:bodyPr rtlCol="0" anchor="ctr"/>
+              <a:lstStyle/>
+              <a:p>
+                <a:pPr algn="ctr"/>
+                <a:endParaRPr lang="fr-FR"/>
+              </a:p>
+            </p:txBody>
+          </p:sp>
+          <p:sp>
+            <p:nvSpPr>
+              <p:cNvPr id="42" name="ZoneTexte 41"/>
+              <p:cNvSpPr txBox="1"/>
+              <p:nvPr/>
+            </p:nvSpPr>
+            <p:spPr>
+              <a:xfrm>
+                <a:off x="6396776" y="6581615"/>
+                <a:ext cx="602671" cy="276999"/>
+              </a:xfrm>
+              <a:prstGeom prst="rect">
+                <a:avLst/>
+              </a:prstGeom>
+              <a:noFill/>
+            </p:spPr>
+            <p:txBody>
+              <a:bodyPr wrap="square" rtlCol="0">
+                <a:spAutoFit/>
+              </a:bodyPr>
+              <a:lstStyle/>
+              <a:p>
+                <a:pPr algn="ctr"/>
+                <a:r>
+                  <a:rPr lang="fr-FR" sz="1200" dirty="0" smtClean="0"/>
+                  <a:t>GS 1</a:t>
+                </a:r>
+                <a:endParaRPr lang="fr-FR" sz="1200" dirty="0"/>
+              </a:p>
+            </p:txBody>
+          </p:sp>
+        </p:grpSp>
       </p:grpSp>
     </p:spTree>
     <p:extLst>

</xml_diff>